<commit_message>
Add link+fix problem with list with level.
</commit_message>
<xml_diff>
--- a/samples/fr.opensagres.xdocreport.samples.pptxandvelocity/src/fr/opensagres/xdocreport/samples/pptxandvelocity/PPTXProjectAndDeveloppersWithVelocity.pptx
+++ b/samples/fr.opensagres.xdocreport.samples.pptxandvelocity/src/fr/opensagres/xdocreport/samples/pptxandvelocity/PPTXProjectAndDeveloppersWithVelocity.pptx
@@ -5180,11 +5180,19 @@
             <a:pPr lvl="1"/>
             <a:r>
               <a:rPr lang="fr-FR" dirty="0" smtClean="0"/>
-              <a:t>Mail: $</a:t>
-            </a:r>
-            <a:r>
-              <a:rPr lang="fr-FR" smtClean="0"/>
-              <a:t>developers.Name</a:t>
+              <a:t>Mail: </a:t>
+            </a:r>
+            <a:r>
+              <a:rPr lang="fr-FR" dirty="0" smtClean="0">
+                <a:hlinkClick r:id="rId2"/>
+              </a:rPr>
+              <a:t>$</a:t>
+            </a:r>
+            <a:r>
+              <a:rPr lang="fr-FR" dirty="0" err="1" smtClean="0">
+                <a:hlinkClick r:id="rId2"/>
+              </a:rPr>
+              <a:t>developers.Mail</a:t>
             </a:r>
             <a:endParaRPr lang="fr-FR" dirty="0"/>
           </a:p>

</xml_diff>